<commit_message>
Minor updates to Prog01
Added a few extra steps to Pro.1.3 exercise.
Very minor updates to Logic-PPT.
</commit_message>
<xml_diff>
--- a/Chap/Prog01/Presentations/Logic.pptx
+++ b/Chap/Prog01/Presentations/Logic.pptx
@@ -261,7 +261,7 @@
           <a:p>
             <a:fld id="{E15B7D8E-2A20-4C0E-991C-872DBB7459A8}" type="datetimeFigureOut">
               <a:rPr lang="da-DK" smtClean="0"/>
-              <a:t>11-08-2022</a:t>
+              <a:t>11-09-2022</a:t>
             </a:fld>
             <a:endParaRPr lang="da-DK"/>
           </a:p>
@@ -429,7 +429,7 @@
           <a:p>
             <a:fld id="{E15B7D8E-2A20-4C0E-991C-872DBB7459A8}" type="datetimeFigureOut">
               <a:rPr lang="da-DK" smtClean="0"/>
-              <a:t>11-08-2022</a:t>
+              <a:t>11-09-2022</a:t>
             </a:fld>
             <a:endParaRPr lang="da-DK"/>
           </a:p>
@@ -607,7 +607,7 @@
           <a:p>
             <a:fld id="{E15B7D8E-2A20-4C0E-991C-872DBB7459A8}" type="datetimeFigureOut">
               <a:rPr lang="da-DK" smtClean="0"/>
-              <a:t>11-08-2022</a:t>
+              <a:t>11-09-2022</a:t>
             </a:fld>
             <a:endParaRPr lang="da-DK"/>
           </a:p>
@@ -775,7 +775,7 @@
           <a:p>
             <a:fld id="{E15B7D8E-2A20-4C0E-991C-872DBB7459A8}" type="datetimeFigureOut">
               <a:rPr lang="da-DK" smtClean="0"/>
-              <a:t>11-08-2022</a:t>
+              <a:t>11-09-2022</a:t>
             </a:fld>
             <a:endParaRPr lang="da-DK"/>
           </a:p>
@@ -1020,7 +1020,7 @@
           <a:p>
             <a:fld id="{E15B7D8E-2A20-4C0E-991C-872DBB7459A8}" type="datetimeFigureOut">
               <a:rPr lang="da-DK" smtClean="0"/>
-              <a:t>11-08-2022</a:t>
+              <a:t>11-09-2022</a:t>
             </a:fld>
             <a:endParaRPr lang="da-DK"/>
           </a:p>
@@ -1249,7 +1249,7 @@
           <a:p>
             <a:fld id="{E15B7D8E-2A20-4C0E-991C-872DBB7459A8}" type="datetimeFigureOut">
               <a:rPr lang="da-DK" smtClean="0"/>
-              <a:t>11-08-2022</a:t>
+              <a:t>11-09-2022</a:t>
             </a:fld>
             <a:endParaRPr lang="da-DK"/>
           </a:p>
@@ -1613,7 +1613,7 @@
           <a:p>
             <a:fld id="{E15B7D8E-2A20-4C0E-991C-872DBB7459A8}" type="datetimeFigureOut">
               <a:rPr lang="da-DK" smtClean="0"/>
-              <a:t>11-08-2022</a:t>
+              <a:t>11-09-2022</a:t>
             </a:fld>
             <a:endParaRPr lang="da-DK"/>
           </a:p>
@@ -1730,7 +1730,7 @@
           <a:p>
             <a:fld id="{E15B7D8E-2A20-4C0E-991C-872DBB7459A8}" type="datetimeFigureOut">
               <a:rPr lang="da-DK" smtClean="0"/>
-              <a:t>11-08-2022</a:t>
+              <a:t>11-09-2022</a:t>
             </a:fld>
             <a:endParaRPr lang="da-DK"/>
           </a:p>
@@ -1825,7 +1825,7 @@
           <a:p>
             <a:fld id="{E15B7D8E-2A20-4C0E-991C-872DBB7459A8}" type="datetimeFigureOut">
               <a:rPr lang="da-DK" smtClean="0"/>
-              <a:t>11-08-2022</a:t>
+              <a:t>11-09-2022</a:t>
             </a:fld>
             <a:endParaRPr lang="da-DK"/>
           </a:p>
@@ -2100,7 +2100,7 @@
           <a:p>
             <a:fld id="{E15B7D8E-2A20-4C0E-991C-872DBB7459A8}" type="datetimeFigureOut">
               <a:rPr lang="da-DK" smtClean="0"/>
-              <a:t>11-08-2022</a:t>
+              <a:t>11-09-2022</a:t>
             </a:fld>
             <a:endParaRPr lang="da-DK"/>
           </a:p>
@@ -2352,7 +2352,7 @@
           <a:p>
             <a:fld id="{E15B7D8E-2A20-4C0E-991C-872DBB7459A8}" type="datetimeFigureOut">
               <a:rPr lang="da-DK" smtClean="0"/>
-              <a:t>11-08-2022</a:t>
+              <a:t>11-09-2022</a:t>
             </a:fld>
             <a:endParaRPr lang="da-DK"/>
           </a:p>
@@ -2563,7 +2563,7 @@
           <a:p>
             <a:fld id="{E15B7D8E-2A20-4C0E-991C-872DBB7459A8}" type="datetimeFigureOut">
               <a:rPr lang="da-DK" smtClean="0"/>
-              <a:t>11-08-2022</a:t>
+              <a:t>11-09-2022</a:t>
             </a:fld>
             <a:endParaRPr lang="da-DK"/>
           </a:p>
@@ -8556,7 +8556,7 @@
           <p:nvPr>
             <p:extLst>
               <p:ext uri="{D42A27DB-BD31-4B8C-83A1-F6EECF244321}">
-                <p14:modId xmlns:p14="http://schemas.microsoft.com/office/powerpoint/2010/main" val="2251833833"/>
+                <p14:modId xmlns:p14="http://schemas.microsoft.com/office/powerpoint/2010/main" val="3571928135"/>
               </p:ext>
             </p:extLst>
           </p:nvPr>
@@ -8658,27 +8658,27 @@
                         </a:spcAft>
                       </a:pPr>
                       <a:r>
-                        <a:rPr lang="en-US" sz="3200">
+                        <a:rPr lang="en-US" sz="3200" dirty="0">
                           <a:effectLst/>
                         </a:rPr>
                         <a:t>a </a:t>
                       </a:r>
                       <a:r>
-                        <a:rPr lang="en-US" sz="3200">
+                        <a:rPr lang="en-US" sz="3200" b="1" dirty="0">
                           <a:solidFill>
-                            <a:srgbClr val="FF0000"/>
+                            <a:srgbClr val="0070C0"/>
                           </a:solidFill>
                           <a:effectLst/>
                         </a:rPr>
                         <a:t>==</a:t>
                       </a:r>
                       <a:r>
-                        <a:rPr lang="en-US" sz="3200">
+                        <a:rPr lang="en-US" sz="3200" dirty="0">
                           <a:effectLst/>
                         </a:rPr>
                         <a:t> b</a:t>
                       </a:r>
-                      <a:endParaRPr lang="da-DK" sz="3200">
+                      <a:endParaRPr lang="da-DK" sz="3200" dirty="0">
                         <a:effectLst/>
                         <a:latin typeface="Calibri" panose="020F0502020204030204" pitchFamily="34" charset="0"/>
                         <a:ea typeface="Calibri" panose="020F0502020204030204" pitchFamily="34" charset="0"/>
@@ -8699,27 +8699,30 @@
                         </a:spcAft>
                       </a:pPr>
                       <a:r>
-                        <a:rPr lang="en-US" sz="3200">
+                        <a:rPr lang="en-US" sz="3200" dirty="0">
                           <a:effectLst/>
                         </a:rPr>
                         <a:t>a is </a:t>
                       </a:r>
                       <a:r>
-                        <a:rPr lang="en-US" sz="3200">
+                        <a:rPr lang="en-US" sz="3200" b="1" kern="1200" dirty="0">
                           <a:solidFill>
-                            <a:srgbClr val="FF0000"/>
+                            <a:srgbClr val="0070C0"/>
                           </a:solidFill>
                           <a:effectLst/>
+                          <a:latin typeface="+mn-lt"/>
+                          <a:ea typeface="+mn-ea"/>
+                          <a:cs typeface="+mn-cs"/>
                         </a:rPr>
                         <a:t>equal</a:t>
                       </a:r>
                       <a:r>
-                        <a:rPr lang="en-US" sz="3200">
+                        <a:rPr lang="en-US" sz="3200" dirty="0">
                           <a:effectLst/>
                         </a:rPr>
                         <a:t> to b</a:t>
                       </a:r>
-                      <a:endParaRPr lang="da-DK" sz="3200">
+                      <a:endParaRPr lang="da-DK" sz="3200" dirty="0">
                         <a:effectLst/>
                         <a:latin typeface="Calibri" panose="020F0502020204030204" pitchFamily="34" charset="0"/>
                         <a:ea typeface="Calibri" panose="020F0502020204030204" pitchFamily="34" charset="0"/>
@@ -8747,27 +8750,30 @@
                         </a:spcAft>
                       </a:pPr>
                       <a:r>
-                        <a:rPr lang="en-US" sz="3200">
+                        <a:rPr lang="en-US" sz="3200" dirty="0">
                           <a:effectLst/>
                         </a:rPr>
                         <a:t>a </a:t>
                       </a:r>
                       <a:r>
-                        <a:rPr lang="en-US" sz="3200">
+                        <a:rPr lang="en-US" sz="3200" b="1" kern="1200" dirty="0">
                           <a:solidFill>
-                            <a:srgbClr val="FF0000"/>
+                            <a:srgbClr val="0070C0"/>
                           </a:solidFill>
                           <a:effectLst/>
+                          <a:latin typeface="+mn-lt"/>
+                          <a:ea typeface="+mn-ea"/>
+                          <a:cs typeface="+mn-cs"/>
                         </a:rPr>
                         <a:t>!=</a:t>
                       </a:r>
                       <a:r>
-                        <a:rPr lang="en-US" sz="3200">
+                        <a:rPr lang="en-US" sz="3200" dirty="0">
                           <a:effectLst/>
                         </a:rPr>
                         <a:t> b</a:t>
                       </a:r>
-                      <a:endParaRPr lang="da-DK" sz="3200">
+                      <a:endParaRPr lang="da-DK" sz="3200" dirty="0">
                         <a:effectLst/>
                         <a:latin typeface="Calibri" panose="020F0502020204030204" pitchFamily="34" charset="0"/>
                         <a:ea typeface="Calibri" panose="020F0502020204030204" pitchFamily="34" charset="0"/>
@@ -8788,27 +8794,30 @@
                         </a:spcAft>
                       </a:pPr>
                       <a:r>
-                        <a:rPr lang="en-US" sz="3200">
+                        <a:rPr lang="en-US" sz="3200" dirty="0">
                           <a:effectLst/>
                         </a:rPr>
                         <a:t>a is </a:t>
                       </a:r>
                       <a:r>
-                        <a:rPr lang="en-US" sz="3200">
+                        <a:rPr lang="en-US" sz="3200" b="1" kern="1200" dirty="0">
                           <a:solidFill>
-                            <a:srgbClr val="FF0000"/>
+                            <a:srgbClr val="0070C0"/>
                           </a:solidFill>
                           <a:effectLst/>
+                          <a:latin typeface="+mn-lt"/>
+                          <a:ea typeface="+mn-ea"/>
+                          <a:cs typeface="+mn-cs"/>
                         </a:rPr>
-                        <a:t>not equal</a:t>
-                      </a:r>
-                      <a:r>
-                        <a:rPr lang="en-US" sz="3200">
+                        <a:t>not equal </a:t>
+                      </a:r>
+                      <a:r>
+                        <a:rPr lang="en-US" sz="3200" dirty="0">
                           <a:effectLst/>
                         </a:rPr>
-                        <a:t> to b</a:t>
-                      </a:r>
-                      <a:endParaRPr lang="da-DK" sz="3200">
+                        <a:t>to b</a:t>
+                      </a:r>
+                      <a:endParaRPr lang="da-DK" sz="3200" dirty="0">
                         <a:effectLst/>
                         <a:latin typeface="Calibri" panose="020F0502020204030204" pitchFamily="34" charset="0"/>
                         <a:ea typeface="Calibri" panose="020F0502020204030204" pitchFamily="34" charset="0"/>
@@ -8836,27 +8845,39 @@
                         </a:spcAft>
                       </a:pPr>
                       <a:r>
-                        <a:rPr lang="en-US" sz="3200">
+                        <a:rPr lang="en-US" sz="3200" dirty="0">
                           <a:effectLst/>
                         </a:rPr>
                         <a:t>a </a:t>
                       </a:r>
                       <a:r>
-                        <a:rPr lang="en-US" sz="3200">
+                        <a:rPr lang="en-US" sz="3200" b="1" kern="1200" dirty="0">
+                          <a:solidFill>
+                            <a:srgbClr val="0070C0"/>
+                          </a:solidFill>
+                          <a:effectLst/>
+                          <a:latin typeface="+mn-lt"/>
+                          <a:ea typeface="+mn-ea"/>
+                          <a:cs typeface="+mn-cs"/>
+                        </a:rPr>
+                        <a:t>&gt;</a:t>
+                      </a:r>
+                      <a:r>
+                        <a:rPr lang="en-US" sz="3200" dirty="0">
                           <a:solidFill>
                             <a:srgbClr val="FF0000"/>
                           </a:solidFill>
                           <a:effectLst/>
                         </a:rPr>
-                        <a:t>&gt; </a:t>
-                      </a:r>
-                      <a:r>
-                        <a:rPr lang="en-US" sz="3200">
+                        <a:t> </a:t>
+                      </a:r>
+                      <a:r>
+                        <a:rPr lang="en-US" sz="3200" dirty="0">
                           <a:effectLst/>
                         </a:rPr>
                         <a:t>b</a:t>
                       </a:r>
-                      <a:endParaRPr lang="da-DK" sz="3200">
+                      <a:endParaRPr lang="da-DK" sz="3200" dirty="0">
                         <a:effectLst/>
                         <a:latin typeface="Calibri" panose="020F0502020204030204" pitchFamily="34" charset="0"/>
                         <a:ea typeface="Calibri" panose="020F0502020204030204" pitchFamily="34" charset="0"/>
@@ -8877,27 +8898,30 @@
                         </a:spcAft>
                       </a:pPr>
                       <a:r>
-                        <a:rPr lang="en-US" sz="3200">
+                        <a:rPr lang="en-US" sz="3200" dirty="0">
                           <a:effectLst/>
                         </a:rPr>
                         <a:t>a is </a:t>
                       </a:r>
                       <a:r>
-                        <a:rPr lang="en-US" sz="3200">
+                        <a:rPr lang="en-US" sz="3200" b="1" kern="1200" dirty="0">
                           <a:solidFill>
-                            <a:srgbClr val="FF0000"/>
+                            <a:srgbClr val="0070C0"/>
                           </a:solidFill>
                           <a:effectLst/>
+                          <a:latin typeface="+mn-lt"/>
+                          <a:ea typeface="+mn-ea"/>
+                          <a:cs typeface="+mn-cs"/>
                         </a:rPr>
-                        <a:t>strictly greater</a:t>
-                      </a:r>
-                      <a:r>
-                        <a:rPr lang="en-US" sz="3200">
+                        <a:t>strictly greater </a:t>
+                      </a:r>
+                      <a:r>
+                        <a:rPr lang="en-US" sz="3200" dirty="0">
                           <a:effectLst/>
                         </a:rPr>
-                        <a:t> than b </a:t>
-                      </a:r>
-                      <a:endParaRPr lang="da-DK" sz="3200">
+                        <a:t>than b </a:t>
+                      </a:r>
+                      <a:endParaRPr lang="da-DK" sz="3200" dirty="0">
                         <a:effectLst/>
                         <a:latin typeface="Calibri" panose="020F0502020204030204" pitchFamily="34" charset="0"/>
                         <a:ea typeface="Calibri" panose="020F0502020204030204" pitchFamily="34" charset="0"/>
@@ -8925,27 +8949,30 @@
                         </a:spcAft>
                       </a:pPr>
                       <a:r>
-                        <a:rPr lang="en-US" sz="3200">
+                        <a:rPr lang="en-US" sz="3200" dirty="0">
                           <a:effectLst/>
                         </a:rPr>
                         <a:t>a </a:t>
                       </a:r>
                       <a:r>
-                        <a:rPr lang="en-US" sz="3200">
+                        <a:rPr lang="en-US" sz="3200" b="1" kern="1200" dirty="0">
                           <a:solidFill>
-                            <a:srgbClr val="FF0000"/>
+                            <a:srgbClr val="0070C0"/>
                           </a:solidFill>
                           <a:effectLst/>
+                          <a:latin typeface="+mn-lt"/>
+                          <a:ea typeface="+mn-ea"/>
+                          <a:cs typeface="+mn-cs"/>
                         </a:rPr>
                         <a:t>&gt;=</a:t>
                       </a:r>
                       <a:r>
-                        <a:rPr lang="en-US" sz="3200">
+                        <a:rPr lang="en-US" sz="3200" dirty="0">
                           <a:effectLst/>
                         </a:rPr>
                         <a:t> b</a:t>
                       </a:r>
-                      <a:endParaRPr lang="da-DK" sz="3200">
+                      <a:endParaRPr lang="da-DK" sz="3200" dirty="0">
                         <a:effectLst/>
                         <a:latin typeface="Calibri" panose="020F0502020204030204" pitchFamily="34" charset="0"/>
                         <a:ea typeface="Calibri" panose="020F0502020204030204" pitchFamily="34" charset="0"/>
@@ -8966,27 +8993,30 @@
                         </a:spcAft>
                       </a:pPr>
                       <a:r>
-                        <a:rPr lang="en-US" sz="3200">
+                        <a:rPr lang="en-US" sz="3200" dirty="0">
                           <a:effectLst/>
                         </a:rPr>
                         <a:t>a is </a:t>
                       </a:r>
                       <a:r>
-                        <a:rPr lang="en-US" sz="3200">
+                        <a:rPr lang="en-US" sz="3200" b="1" kern="1200" dirty="0">
                           <a:solidFill>
-                            <a:srgbClr val="FF0000"/>
+                            <a:srgbClr val="0070C0"/>
                           </a:solidFill>
                           <a:effectLst/>
+                          <a:latin typeface="+mn-lt"/>
+                          <a:ea typeface="+mn-ea"/>
+                          <a:cs typeface="+mn-cs"/>
                         </a:rPr>
-                        <a:t>greater than or equal</a:t>
-                      </a:r>
-                      <a:r>
-                        <a:rPr lang="en-US" sz="3200">
+                        <a:t>greater than or equal </a:t>
+                      </a:r>
+                      <a:r>
+                        <a:rPr lang="en-US" sz="3200" dirty="0">
                           <a:effectLst/>
                         </a:rPr>
-                        <a:t> to b</a:t>
-                      </a:r>
-                      <a:endParaRPr lang="da-DK" sz="3200">
+                        <a:t>to b</a:t>
+                      </a:r>
+                      <a:endParaRPr lang="da-DK" sz="3200" dirty="0">
                         <a:effectLst/>
                         <a:latin typeface="Calibri" panose="020F0502020204030204" pitchFamily="34" charset="0"/>
                         <a:ea typeface="Calibri" panose="020F0502020204030204" pitchFamily="34" charset="0"/>
@@ -9014,27 +9044,30 @@
                         </a:spcAft>
                       </a:pPr>
                       <a:r>
-                        <a:rPr lang="en-US" sz="3200">
+                        <a:rPr lang="en-US" sz="3200" dirty="0">
                           <a:effectLst/>
                         </a:rPr>
                         <a:t>a </a:t>
                       </a:r>
                       <a:r>
-                        <a:rPr lang="en-US" sz="3200">
+                        <a:rPr lang="en-US" sz="3200" b="1" kern="1200" dirty="0">
                           <a:solidFill>
-                            <a:srgbClr val="FF0000"/>
+                            <a:srgbClr val="0070C0"/>
                           </a:solidFill>
                           <a:effectLst/>
+                          <a:latin typeface="+mn-lt"/>
+                          <a:ea typeface="+mn-ea"/>
+                          <a:cs typeface="+mn-cs"/>
                         </a:rPr>
                         <a:t>&lt;</a:t>
                       </a:r>
                       <a:r>
-                        <a:rPr lang="en-US" sz="3200">
+                        <a:rPr lang="en-US" sz="3200" dirty="0">
                           <a:effectLst/>
                         </a:rPr>
                         <a:t> b</a:t>
                       </a:r>
-                      <a:endParaRPr lang="da-DK" sz="3200">
+                      <a:endParaRPr lang="da-DK" sz="3200" dirty="0">
                         <a:effectLst/>
                         <a:latin typeface="Calibri" panose="020F0502020204030204" pitchFamily="34" charset="0"/>
                         <a:ea typeface="Calibri" panose="020F0502020204030204" pitchFamily="34" charset="0"/>
@@ -9055,27 +9088,30 @@
                         </a:spcAft>
                       </a:pPr>
                       <a:r>
-                        <a:rPr lang="en-US" sz="3200">
+                        <a:rPr lang="en-US" sz="3200" dirty="0">
                           <a:effectLst/>
                         </a:rPr>
                         <a:t>a is </a:t>
                       </a:r>
                       <a:r>
-                        <a:rPr lang="en-US" sz="3200">
+                        <a:rPr lang="en-US" sz="3200" b="1" kern="1200" dirty="0">
                           <a:solidFill>
-                            <a:srgbClr val="FF0000"/>
+                            <a:srgbClr val="0070C0"/>
                           </a:solidFill>
                           <a:effectLst/>
+                          <a:latin typeface="+mn-lt"/>
+                          <a:ea typeface="+mn-ea"/>
+                          <a:cs typeface="+mn-cs"/>
                         </a:rPr>
-                        <a:t>strictly smaller</a:t>
-                      </a:r>
-                      <a:r>
-                        <a:rPr lang="en-US" sz="3200">
+                        <a:t>strictly smaller </a:t>
+                      </a:r>
+                      <a:r>
+                        <a:rPr lang="en-US" sz="3200" dirty="0">
                           <a:effectLst/>
                         </a:rPr>
-                        <a:t> than b</a:t>
-                      </a:r>
-                      <a:endParaRPr lang="da-DK" sz="3200">
+                        <a:t>than b</a:t>
+                      </a:r>
+                      <a:endParaRPr lang="da-DK" sz="3200" dirty="0">
                         <a:effectLst/>
                         <a:latin typeface="Calibri" panose="020F0502020204030204" pitchFamily="34" charset="0"/>
                         <a:ea typeface="Calibri" panose="020F0502020204030204" pitchFamily="34" charset="0"/>
@@ -9103,27 +9139,30 @@
                         </a:spcAft>
                       </a:pPr>
                       <a:r>
-                        <a:rPr lang="en-US" sz="3200">
+                        <a:rPr lang="en-US" sz="3200" dirty="0">
                           <a:effectLst/>
                         </a:rPr>
                         <a:t>a </a:t>
                       </a:r>
                       <a:r>
-                        <a:rPr lang="en-US" sz="3200">
+                        <a:rPr lang="en-US" sz="3200" b="1" kern="1200" dirty="0">
                           <a:solidFill>
-                            <a:srgbClr val="FF0000"/>
+                            <a:srgbClr val="0070C0"/>
                           </a:solidFill>
                           <a:effectLst/>
+                          <a:latin typeface="+mn-lt"/>
+                          <a:ea typeface="+mn-ea"/>
+                          <a:cs typeface="+mn-cs"/>
                         </a:rPr>
                         <a:t>&lt;=</a:t>
                       </a:r>
                       <a:r>
-                        <a:rPr lang="en-US" sz="3200">
+                        <a:rPr lang="en-US" sz="3200" dirty="0">
                           <a:effectLst/>
                         </a:rPr>
                         <a:t> b</a:t>
                       </a:r>
-                      <a:endParaRPr lang="da-DK" sz="3200">
+                      <a:endParaRPr lang="da-DK" sz="3200" dirty="0">
                         <a:effectLst/>
                         <a:latin typeface="Calibri" panose="020F0502020204030204" pitchFamily="34" charset="0"/>
                         <a:ea typeface="Calibri" panose="020F0502020204030204" pitchFamily="34" charset="0"/>
@@ -9144,27 +9183,30 @@
                         </a:spcAft>
                       </a:pPr>
                       <a:r>
-                        <a:rPr lang="en-US" sz="3200">
+                        <a:rPr lang="en-US" sz="3200" dirty="0">
                           <a:effectLst/>
                         </a:rPr>
                         <a:t>a is </a:t>
                       </a:r>
                       <a:r>
-                        <a:rPr lang="en-US" sz="3200">
+                        <a:rPr lang="en-US" sz="3200" b="1" kern="1200" dirty="0">
                           <a:solidFill>
-                            <a:srgbClr val="FF0000"/>
+                            <a:srgbClr val="0070C0"/>
                           </a:solidFill>
                           <a:effectLst/>
+                          <a:latin typeface="+mn-lt"/>
+                          <a:ea typeface="+mn-ea"/>
+                          <a:cs typeface="+mn-cs"/>
                         </a:rPr>
-                        <a:t>smaller than or equal</a:t>
-                      </a:r>
-                      <a:r>
-                        <a:rPr lang="en-US" sz="3200">
+                        <a:t>smaller than or equal </a:t>
+                      </a:r>
+                      <a:r>
+                        <a:rPr lang="en-US" sz="3200" dirty="0">
                           <a:effectLst/>
                         </a:rPr>
-                        <a:t> to b</a:t>
-                      </a:r>
-                      <a:endParaRPr lang="da-DK" sz="3200">
+                        <a:t>to b</a:t>
+                      </a:r>
+                      <a:endParaRPr lang="da-DK" sz="3200" dirty="0">
                         <a:effectLst/>
                         <a:latin typeface="Calibri" panose="020F0502020204030204" pitchFamily="34" charset="0"/>
                         <a:ea typeface="Calibri" panose="020F0502020204030204" pitchFamily="34" charset="0"/>

</xml_diff>